<commit_message>
Modified Presentation and included the new GUI screenshots.
</commit_message>
<xml_diff>
--- a/Project PPT.pptx
+++ b/Project PPT.pptx
@@ -217,7 +217,7 @@
           <a:p>
             <a:fld id="{14E7B69E-44BD-4B2C-9F4A-7F29B168F9BE}" type="datetimeFigureOut">
               <a:rPr lang="en-IN" smtClean="0"/>
-              <a:t>12-11-2025</a:t>
+              <a:t>13-11-2025</a:t>
             </a:fld>
             <a:endParaRPr lang="en-IN"/>
           </a:p>
@@ -1314,7 +1314,7 @@
           <a:p>
             <a:fld id="{5BCAD085-E8A6-8845-BD4E-CB4CCA059FC4}" type="datetimeFigureOut">
               <a:rPr lang="en-US" smtClean="0"/>
-              <a:t>11/12/2025</a:t>
+              <a:t>11/13/2025</a:t>
             </a:fld>
             <a:endParaRPr lang="en-US"/>
           </a:p>
@@ -1565,7 +1565,7 @@
           <a:p>
             <a:fld id="{5BCAD085-E8A6-8845-BD4E-CB4CCA059FC4}" type="datetimeFigureOut">
               <a:rPr lang="en-US" smtClean="0"/>
-              <a:t>11/12/2025</a:t>
+              <a:t>11/13/2025</a:t>
             </a:fld>
             <a:endParaRPr lang="en-US"/>
           </a:p>
@@ -1879,7 +1879,7 @@
           <a:p>
             <a:fld id="{5BCAD085-E8A6-8845-BD4E-CB4CCA059FC4}" type="datetimeFigureOut">
               <a:rPr lang="en-US" smtClean="0"/>
-              <a:t>11/12/2025</a:t>
+              <a:t>11/13/2025</a:t>
             </a:fld>
             <a:endParaRPr lang="en-US"/>
           </a:p>
@@ -2212,7 +2212,7 @@
           <a:p>
             <a:fld id="{5BCAD085-E8A6-8845-BD4E-CB4CCA059FC4}" type="datetimeFigureOut">
               <a:rPr lang="en-US" smtClean="0"/>
-              <a:t>11/12/2025</a:t>
+              <a:t>11/13/2025</a:t>
             </a:fld>
             <a:endParaRPr lang="en-US"/>
           </a:p>
@@ -2526,7 +2526,7 @@
           <a:p>
             <a:fld id="{5BCAD085-E8A6-8845-BD4E-CB4CCA059FC4}" type="datetimeFigureOut">
               <a:rPr lang="en-US" smtClean="0"/>
-              <a:t>11/12/2025</a:t>
+              <a:t>11/13/2025</a:t>
             </a:fld>
             <a:endParaRPr lang="en-US"/>
           </a:p>
@@ -2919,7 +2919,7 @@
           <a:p>
             <a:fld id="{5BCAD085-E8A6-8845-BD4E-CB4CCA059FC4}" type="datetimeFigureOut">
               <a:rPr lang="en-US" smtClean="0"/>
-              <a:t>11/12/2025</a:t>
+              <a:t>11/13/2025</a:t>
             </a:fld>
             <a:endParaRPr lang="en-US"/>
           </a:p>
@@ -3089,7 +3089,7 @@
           <a:p>
             <a:fld id="{5BCAD085-E8A6-8845-BD4E-CB4CCA059FC4}" type="datetimeFigureOut">
               <a:rPr lang="en-US" smtClean="0"/>
-              <a:t>11/12/2025</a:t>
+              <a:t>11/13/2025</a:t>
             </a:fld>
             <a:endParaRPr lang="en-US"/>
           </a:p>
@@ -3269,7 +3269,7 @@
           <a:p>
             <a:fld id="{5BCAD085-E8A6-8845-BD4E-CB4CCA059FC4}" type="datetimeFigureOut">
               <a:rPr lang="en-US" smtClean="0"/>
-              <a:t>11/12/2025</a:t>
+              <a:t>11/13/2025</a:t>
             </a:fld>
             <a:endParaRPr lang="en-US"/>
           </a:p>
@@ -3439,7 +3439,7 @@
           <a:p>
             <a:fld id="{5BCAD085-E8A6-8845-BD4E-CB4CCA059FC4}" type="datetimeFigureOut">
               <a:rPr lang="en-US" smtClean="0"/>
-              <a:t>11/12/2025</a:t>
+              <a:t>11/13/2025</a:t>
             </a:fld>
             <a:endParaRPr lang="en-US"/>
           </a:p>
@@ -3686,7 +3686,7 @@
           <a:p>
             <a:fld id="{5BCAD085-E8A6-8845-BD4E-CB4CCA059FC4}" type="datetimeFigureOut">
               <a:rPr lang="en-US" smtClean="0"/>
-              <a:t>11/12/2025</a:t>
+              <a:t>11/13/2025</a:t>
             </a:fld>
             <a:endParaRPr lang="en-US"/>
           </a:p>
@@ -3918,7 +3918,7 @@
           <a:p>
             <a:fld id="{5BCAD085-E8A6-8845-BD4E-CB4CCA059FC4}" type="datetimeFigureOut">
               <a:rPr lang="en-US" smtClean="0"/>
-              <a:t>11/12/2025</a:t>
+              <a:t>11/13/2025</a:t>
             </a:fld>
             <a:endParaRPr lang="en-US"/>
           </a:p>
@@ -4292,7 +4292,7 @@
           <a:p>
             <a:fld id="{5BCAD085-E8A6-8845-BD4E-CB4CCA059FC4}" type="datetimeFigureOut">
               <a:rPr lang="en-US" smtClean="0"/>
-              <a:t>11/12/2025</a:t>
+              <a:t>11/13/2025</a:t>
             </a:fld>
             <a:endParaRPr lang="en-US"/>
           </a:p>
@@ -4415,7 +4415,7 @@
           <a:p>
             <a:fld id="{5BCAD085-E8A6-8845-BD4E-CB4CCA059FC4}" type="datetimeFigureOut">
               <a:rPr lang="en-US" smtClean="0"/>
-              <a:t>11/12/2025</a:t>
+              <a:t>11/13/2025</a:t>
             </a:fld>
             <a:endParaRPr lang="en-US"/>
           </a:p>
@@ -4510,7 +4510,7 @@
           <a:p>
             <a:fld id="{5BCAD085-E8A6-8845-BD4E-CB4CCA059FC4}" type="datetimeFigureOut">
               <a:rPr lang="en-US" smtClean="0"/>
-              <a:t>11/12/2025</a:t>
+              <a:t>11/13/2025</a:t>
             </a:fld>
             <a:endParaRPr lang="en-US"/>
           </a:p>
@@ -4765,7 +4765,7 @@
           <a:p>
             <a:fld id="{5BCAD085-E8A6-8845-BD4E-CB4CCA059FC4}" type="datetimeFigureOut">
               <a:rPr lang="en-US" smtClean="0"/>
-              <a:t>11/12/2025</a:t>
+              <a:t>11/13/2025</a:t>
             </a:fld>
             <a:endParaRPr lang="en-US"/>
           </a:p>
@@ -5070,7 +5070,7 @@
           <a:p>
             <a:fld id="{5BCAD085-E8A6-8845-BD4E-CB4CCA059FC4}" type="datetimeFigureOut">
               <a:rPr lang="en-US" smtClean="0"/>
-              <a:t>11/12/2025</a:t>
+              <a:t>11/13/2025</a:t>
             </a:fld>
             <a:endParaRPr lang="en-US"/>
           </a:p>
@@ -5772,7 +5772,7 @@
           <a:p>
             <a:fld id="{5BCAD085-E8A6-8845-BD4E-CB4CCA059FC4}" type="datetimeFigureOut">
               <a:rPr lang="en-US" smtClean="0"/>
-              <a:t>11/12/2025</a:t>
+              <a:t>11/13/2025</a:t>
             </a:fld>
             <a:endParaRPr lang="en-US"/>
           </a:p>
@@ -7996,9 +7996,9 @@
             <a:endParaRPr lang="en-US" dirty="0"/>
           </a:p>
           <a:p>
-            <a:endParaRPr lang="en-US" dirty="0"/>
-          </a:p>
-          <a:p>
+            <a:pPr marL="0" indent="0">
+              <a:buNone/>
+            </a:pPr>
             <a:endParaRPr dirty="0"/>
           </a:p>
           <a:p>
@@ -8024,21 +8024,14 @@
           <p:nvPr/>
         </p:nvPicPr>
         <p:blipFill>
-          <a:blip r:embed="rId3">
-            <a:extLst>
-              <a:ext uri="{28A0092B-C50C-407E-A947-70E740481C1C}">
-                <a14:useLocalDpi xmlns:a14="http://schemas.microsoft.com/office/drawing/2010/main" val="0"/>
-              </a:ext>
-            </a:extLst>
-          </a:blip>
-          <a:stretch>
-            <a:fillRect/>
-          </a:stretch>
+          <a:blip r:embed="rId3"/>
+          <a:srcRect/>
+          <a:stretch/>
         </p:blipFill>
         <p:spPr>
           <a:xfrm>
-            <a:off x="677334" y="2554841"/>
-            <a:ext cx="3761536" cy="1084286"/>
+            <a:off x="876154" y="2098208"/>
+            <a:ext cx="3322569" cy="1628710"/>
           </a:xfrm>
           <a:prstGeom prst="rect">
             <a:avLst/>
@@ -8059,21 +8052,14 @@
           <p:nvPr/>
         </p:nvPicPr>
         <p:blipFill>
-          <a:blip r:embed="rId4">
-            <a:extLst>
-              <a:ext uri="{28A0092B-C50C-407E-A947-70E740481C1C}">
-                <a14:useLocalDpi xmlns:a14="http://schemas.microsoft.com/office/drawing/2010/main" val="0"/>
-              </a:ext>
-            </a:extLst>
-          </a:blip>
-          <a:stretch>
-            <a:fillRect/>
-          </a:stretch>
+          <a:blip r:embed="rId4"/>
+          <a:srcRect/>
+          <a:stretch/>
         </p:blipFill>
         <p:spPr>
           <a:xfrm>
-            <a:off x="4760421" y="2168725"/>
-            <a:ext cx="2192431" cy="1956244"/>
+            <a:off x="4952335" y="2029119"/>
+            <a:ext cx="1808602" cy="1956244"/>
           </a:xfrm>
           <a:prstGeom prst="rect">
             <a:avLst/>
@@ -8103,21 +8089,14 @@
           <p:nvPr/>
         </p:nvPicPr>
         <p:blipFill>
-          <a:blip r:embed="rId5">
-            <a:extLst>
-              <a:ext uri="{28A0092B-C50C-407E-A947-70E740481C1C}">
-                <a14:useLocalDpi xmlns:a14="http://schemas.microsoft.com/office/drawing/2010/main" val="0"/>
-              </a:ext>
-            </a:extLst>
-          </a:blip>
-          <a:stretch>
-            <a:fillRect/>
-          </a:stretch>
+          <a:blip r:embed="rId5"/>
+          <a:srcRect/>
+          <a:stretch/>
         </p:blipFill>
         <p:spPr>
           <a:xfrm>
-            <a:off x="7514549" y="1270000"/>
-            <a:ext cx="1581628" cy="2879437"/>
+            <a:off x="7514549" y="1501371"/>
+            <a:ext cx="1581628" cy="2695043"/>
           </a:xfrm>
           <a:prstGeom prst="rect">
             <a:avLst/>
@@ -8138,21 +8117,14 @@
           <p:nvPr/>
         </p:nvPicPr>
         <p:blipFill>
-          <a:blip r:embed="rId6">
-            <a:extLst>
-              <a:ext uri="{28A0092B-C50C-407E-A947-70E740481C1C}">
-                <a14:useLocalDpi xmlns:a14="http://schemas.microsoft.com/office/drawing/2010/main" val="0"/>
-              </a:ext>
-            </a:extLst>
-          </a:blip>
-          <a:stretch>
-            <a:fillRect/>
-          </a:stretch>
+          <a:blip r:embed="rId6"/>
+          <a:srcRect/>
+          <a:stretch/>
         </p:blipFill>
         <p:spPr>
           <a:xfrm>
-            <a:off x="2674539" y="5387984"/>
-            <a:ext cx="3125897" cy="950487"/>
+            <a:off x="2537438" y="4890608"/>
+            <a:ext cx="3336404" cy="1072883"/>
           </a:xfrm>
           <a:prstGeom prst="rect">
             <a:avLst/>
@@ -8210,7 +8182,7 @@
         </p:nvSpPr>
         <p:spPr>
           <a:xfrm>
-            <a:off x="5403532" y="4224794"/>
+            <a:off x="5403532" y="4029455"/>
             <a:ext cx="793807" cy="276999"/>
           </a:xfrm>
           <a:prstGeom prst="rect">
@@ -8286,7 +8258,7 @@
         </p:nvSpPr>
         <p:spPr>
           <a:xfrm>
-            <a:off x="3893482" y="6449405"/>
+            <a:off x="3861635" y="6046000"/>
             <a:ext cx="688009" cy="276999"/>
           </a:xfrm>
           <a:prstGeom prst="rect">

</xml_diff>